<commit_message>
content providers added as instances
</commit_message>
<xml_diff>
--- a/output.pptx
+++ b/output.pptx
@@ -289,7 +289,7 @@
             <a:fld id="{5BCAD085-E8A6-8845-BD4E-CB4CCA059FC4}" type="datetimeFigureOut">
               <a:rPr lang="en-US" smtClean="0"/>
               <a:pPr/>
-              <a:t>7/24/2014</a:t>
+              <a:t>8/4/2014</a:t>
             </a:fld>
             <a:endParaRPr lang="en-US"/>
           </a:p>
@@ -461,7 +461,7 @@
             <a:fld id="{5BCAD085-E8A6-8845-BD4E-CB4CCA059FC4}" type="datetimeFigureOut">
               <a:rPr lang="en-US" smtClean="0"/>
               <a:pPr/>
-              <a:t>7/24/2014</a:t>
+              <a:t>8/4/2014</a:t>
             </a:fld>
             <a:endParaRPr lang="en-US"/>
           </a:p>
@@ -643,7 +643,7 @@
             <a:fld id="{5BCAD085-E8A6-8845-BD4E-CB4CCA059FC4}" type="datetimeFigureOut">
               <a:rPr lang="en-US" smtClean="0"/>
               <a:pPr/>
-              <a:t>7/24/2014</a:t>
+              <a:t>8/4/2014</a:t>
             </a:fld>
             <a:endParaRPr lang="en-US"/>
           </a:p>
@@ -815,7 +815,7 @@
             <a:fld id="{5BCAD085-E8A6-8845-BD4E-CB4CCA059FC4}" type="datetimeFigureOut">
               <a:rPr lang="en-US" smtClean="0"/>
               <a:pPr/>
-              <a:t>7/24/2014</a:t>
+              <a:t>8/4/2014</a:t>
             </a:fld>
             <a:endParaRPr lang="en-US"/>
           </a:p>
@@ -1063,7 +1063,7 @@
             <a:fld id="{5BCAD085-E8A6-8845-BD4E-CB4CCA059FC4}" type="datetimeFigureOut">
               <a:rPr lang="en-US" smtClean="0"/>
               <a:pPr/>
-              <a:t>7/24/2014</a:t>
+              <a:t>8/4/2014</a:t>
             </a:fld>
             <a:endParaRPr lang="en-US"/>
           </a:p>
@@ -1353,7 +1353,7 @@
             <a:fld id="{5BCAD085-E8A6-8845-BD4E-CB4CCA059FC4}" type="datetimeFigureOut">
               <a:rPr lang="en-US" smtClean="0"/>
               <a:pPr/>
-              <a:t>7/24/2014</a:t>
+              <a:t>8/4/2014</a:t>
             </a:fld>
             <a:endParaRPr lang="en-US"/>
           </a:p>
@@ -1777,7 +1777,7 @@
             <a:fld id="{5BCAD085-E8A6-8845-BD4E-CB4CCA059FC4}" type="datetimeFigureOut">
               <a:rPr lang="en-US" smtClean="0"/>
               <a:pPr/>
-              <a:t>7/24/2014</a:t>
+              <a:t>8/4/2014</a:t>
             </a:fld>
             <a:endParaRPr lang="en-US"/>
           </a:p>
@@ -1897,7 +1897,7 @@
             <a:fld id="{5BCAD085-E8A6-8845-BD4E-CB4CCA059FC4}" type="datetimeFigureOut">
               <a:rPr lang="en-US" smtClean="0"/>
               <a:pPr/>
-              <a:t>7/24/2014</a:t>
+              <a:t>8/4/2014</a:t>
             </a:fld>
             <a:endParaRPr lang="en-US"/>
           </a:p>
@@ -1994,7 +1994,7 @@
             <a:fld id="{5BCAD085-E8A6-8845-BD4E-CB4CCA059FC4}" type="datetimeFigureOut">
               <a:rPr lang="en-US" smtClean="0"/>
               <a:pPr/>
-              <a:t>7/24/2014</a:t>
+              <a:t>8/4/2014</a:t>
             </a:fld>
             <a:endParaRPr lang="en-US"/>
           </a:p>
@@ -2273,7 +2273,7 @@
             <a:fld id="{5BCAD085-E8A6-8845-BD4E-CB4CCA059FC4}" type="datetimeFigureOut">
               <a:rPr lang="en-US" smtClean="0"/>
               <a:pPr/>
-              <a:t>7/24/2014</a:t>
+              <a:t>8/4/2014</a:t>
             </a:fld>
             <a:endParaRPr lang="en-US"/>
           </a:p>
@@ -2528,7 +2528,7 @@
             <a:fld id="{5BCAD085-E8A6-8845-BD4E-CB4CCA059FC4}" type="datetimeFigureOut">
               <a:rPr lang="en-US" smtClean="0"/>
               <a:pPr/>
-              <a:t>7/24/2014</a:t>
+              <a:t>8/4/2014</a:t>
             </a:fld>
             <a:endParaRPr lang="en-US"/>
           </a:p>
@@ -2743,7 +2743,7 @@
             <a:fld id="{5BCAD085-E8A6-8845-BD4E-CB4CCA059FC4}" type="datetimeFigureOut">
               <a:rPr lang="en-US" smtClean="0"/>
               <a:pPr/>
-              <a:t>7/24/2014</a:t>
+              <a:t>8/4/2014</a:t>
             </a:fld>
             <a:endParaRPr lang="en-US"/>
           </a:p>
@@ -3425,7 +3425,7 @@
           <a:p>
             <a:pPr algn="ctr"/>
             <a:r>
-              <a:t>ItemC</a:t>
+              <a:t>testText</a:t>
             </a:r>
           </a:p>
         </p:txBody>

</xml_diff>